<commit_message>
Updated SANDBOX_videos to EXAMPLE_DATASET with INPUT and OUTPUT directories for clarity, generated event marks for 20200723, bundling first draft sample database for shiqi
</commit_message>
<xml_diff>
--- a/wls_gated_dlc_triangulation/Weighted_Least_Squares.pptx
+++ b/wls_gated_dlc_triangulation/Weighted_Least_Squares.pptx
@@ -243,7 +243,7 @@
           <a:p>
             <a:fld id="{579C439E-8EF2-3F4B-88D4-5AEF9FA194D5}" type="datetimeFigureOut">
               <a:rPr lang="en-US" smtClean="0"/>
-              <a:t>7/9/24</a:t>
+              <a:t>7/10/24</a:t>
             </a:fld>
             <a:endParaRPr lang="en-US"/>
           </a:p>
@@ -823,7 +823,7 @@
           <a:p>
             <a:fld id="{1D8BD707-D9CF-40AE-B4C6-C98DA3205C09}" type="datetimeFigureOut">
               <a:rPr lang="en-US"/>
-              <a:t>7/9/24</a:t>
+              <a:t>7/10/24</a:t>
             </a:fld>
             <a:endParaRPr lang="en-US"/>
           </a:p>
@@ -994,7 +994,7 @@
           <a:p>
             <a:fld id="{1D8BD707-D9CF-40AE-B4C6-C98DA3205C09}" type="datetimeFigureOut">
               <a:rPr lang="en-US"/>
-              <a:t>7/9/24</a:t>
+              <a:t>7/10/24</a:t>
             </a:fld>
             <a:endParaRPr lang="en-US"/>
           </a:p>
@@ -1208,7 +1208,7 @@
           <a:p>
             <a:fld id="{1D8BD707-D9CF-40AE-B4C6-C98DA3205C09}" type="datetimeFigureOut">
               <a:rPr lang="en-US"/>
-              <a:t>7/9/24</a:t>
+              <a:t>7/10/24</a:t>
             </a:fld>
             <a:endParaRPr lang="en-US"/>
           </a:p>
@@ -1414,7 +1414,7 @@
           <a:p>
             <a:fld id="{1D8BD707-D9CF-40AE-B4C6-C98DA3205C09}" type="datetimeFigureOut">
               <a:rPr lang="en-US"/>
-              <a:t>7/9/24</a:t>
+              <a:t>7/10/24</a:t>
             </a:fld>
             <a:endParaRPr lang="en-US"/>
           </a:p>
@@ -1533,7 +1533,7 @@
           <a:p>
             <a:fld id="{1D8BD707-D9CF-40AE-B4C6-C98DA3205C09}" type="datetimeFigureOut">
               <a:rPr lang="en-US"/>
-              <a:t>7/9/24</a:t>
+              <a:t>7/10/24</a:t>
             </a:fld>
             <a:endParaRPr lang="en-US"/>
           </a:p>
@@ -1752,7 +1752,7 @@
           <a:p>
             <a:fld id="{1D8BD707-D9CF-40AE-B4C6-C98DA3205C09}" type="datetimeFigureOut">
               <a:rPr lang="en-US"/>
-              <a:t>7/9/24</a:t>
+              <a:t>7/10/24</a:t>
             </a:fld>
             <a:endParaRPr lang="en-US"/>
           </a:p>
@@ -5235,14 +5235,14 @@
                 </a:spcBef>
               </a:pPr>
               <a:r>
-                <a:rPr lang="en-US" sz="1200" b="1" spc="-254" dirty="0">
+                <a:rPr lang="en-US" sz="1200" spc="-254" dirty="0">
                   <a:latin typeface="Diagramm"/>
                   <a:cs typeface="Diagramm"/>
                 </a:rPr>
                 <a:t>                      </a:t>
               </a:r>
               <a:r>
-                <a:rPr lang="en-US" sz="6000" b="1" spc="-254" dirty="0">
+                <a:rPr lang="en-US" sz="6000" spc="-254" dirty="0">
                   <a:latin typeface="Diagramm"/>
                   <a:cs typeface="Diagramm"/>
                 </a:rPr>
@@ -5356,14 +5356,14 @@
                 </a:spcBef>
               </a:pPr>
               <a:r>
-                <a:rPr lang="en-US" sz="1200" b="1" spc="-254" dirty="0">
+                <a:rPr lang="en-US" sz="1200" spc="-254" dirty="0">
                   <a:latin typeface="Diagramm"/>
                   <a:cs typeface="Diagramm"/>
                 </a:rPr>
                 <a:t>                      </a:t>
               </a:r>
               <a:r>
-                <a:rPr lang="en-US" sz="6000" b="1" spc="-254" dirty="0">
+                <a:rPr lang="en-US" sz="6000" spc="-254" dirty="0">
                   <a:latin typeface="Diagramm"/>
                   <a:cs typeface="Diagramm"/>
                 </a:rPr>
@@ -5477,14 +5477,14 @@
                 </a:spcBef>
               </a:pPr>
               <a:r>
-                <a:rPr lang="en-US" sz="1200" b="1" spc="-254" dirty="0">
+                <a:rPr lang="en-US" sz="1200" spc="-254" dirty="0">
                   <a:latin typeface="Diagramm"/>
                   <a:cs typeface="Diagramm"/>
                 </a:rPr>
                 <a:t>                      </a:t>
               </a:r>
               <a:r>
-                <a:rPr lang="en-US" sz="6000" b="1" spc="-254" dirty="0">
+                <a:rPr lang="en-US" sz="6000" spc="-254" dirty="0">
                   <a:latin typeface="Diagramm"/>
                   <a:cs typeface="Diagramm"/>
                 </a:rPr>

</xml_diff>